<commit_message>
Some minor updates on the slides
</commit_message>
<xml_diff>
--- a/DataAccess.pptx
+++ b/DataAccess.pptx
@@ -12985,7 +12985,9 @@
         </p:nvSpPr>
         <p:spPr/>
         <p:txBody>
-          <a:bodyPr/>
+          <a:bodyPr>
+            <a:normAutofit lnSpcReduction="10000"/>
+          </a:bodyPr>
           <a:lstStyle/>
           <a:p>
             <a:r>
@@ -12997,36 +12999,66 @@
               <a:t> </a:t>
             </a:r>
             <a:r>
-              <a:rPr lang="en-GB" dirty="0" err="1"/>
+              <a:rPr lang="en-GB" err="1"/>
               <a:t>varför</a:t>
             </a:r>
             <a:r>
-              <a:rPr lang="en-GB" dirty="0"/>
+              <a:rPr lang="en-GB"/>
               <a:t> </a:t>
             </a:r>
             <a:r>
-              <a:rPr lang="en-GB" dirty="0" smtClean="0"/>
-              <a:t>ORM </a:t>
-            </a:r>
-            <a:r>
-              <a:rPr lang="en-GB" dirty="0" err="1" smtClean="0"/>
-              <a:t>ochch</a:t>
-            </a:r>
-            <a:r>
-              <a:rPr lang="en-GB" dirty="0" smtClean="0"/>
-              <a:t> </a:t>
-            </a:r>
-            <a:r>
-              <a:rPr lang="en-GB" dirty="0" err="1" smtClean="0"/>
-              <a:t>Varför</a:t>
-            </a:r>
-            <a:r>
-              <a:rPr lang="en-GB" dirty="0" smtClean="0"/>
-              <a:t> </a:t>
-            </a:r>
-            <a:r>
-              <a:rPr lang="en-GB" dirty="0"/>
-              <a:t>Code First. </a:t>
+              <a:rPr lang="en-GB"/>
+              <a:t>ORM</a:t>
+            </a:r>
+            <a:r>
+              <a:rPr lang="en-GB"/>
+              <a:t>: </a:t>
+            </a:r>
+            <a:r>
+              <a:rPr lang="en-GB" smtClean="0"/>
+              <a:t>(testbarhet, CRUD, men kanske ej för komplexa frågor…) </a:t>
+            </a:r>
+            <a:r>
+              <a:rPr lang="en-GB" smtClean="0">
+                <a:hlinkClick r:id="rId2"/>
+              </a:rPr>
+              <a:t>https</a:t>
+            </a:r>
+            <a:r>
+              <a:rPr lang="en-GB">
+                <a:hlinkClick r:id="rId2"/>
+              </a:rPr>
+              <a:t>://</a:t>
+            </a:r>
+            <a:r>
+              <a:rPr lang="en-GB">
+                <a:hlinkClick r:id="rId2"/>
+              </a:rPr>
+              <a:t>kevinlawry.wordpress.com/2012/08/07/why-i-avoid-stored-procedures-and-you-should-too</a:t>
+            </a:r>
+            <a:r>
+              <a:rPr lang="en-GB" smtClean="0">
+                <a:hlinkClick r:id="rId2"/>
+              </a:rPr>
+              <a:t>/</a:t>
+            </a:r>
+            <a:endParaRPr lang="en-GB" smtClean="0"/>
+          </a:p>
+          <a:p>
+            <a:endParaRPr lang="en-GB"/>
+          </a:p>
+          <a:p>
+            <a:r>
+              <a:rPr lang="en-GB" smtClean="0"/>
+              <a:t>Varför </a:t>
+            </a:r>
+            <a:r>
+              <a:rPr lang="en-GB"/>
+              <a:t>Code </a:t>
+            </a:r>
+            <a:r>
+              <a:rPr lang="en-GB" smtClean="0"/>
+              <a:t>First Migrations: Db versionshantering och huvudscenariot för MS (EF 7).</a:t>
             </a:r>
             <a:endParaRPr lang="sv-SE" dirty="0"/>
           </a:p>
@@ -13087,11 +13119,11 @@
           <a:p>
             <a:r>
               <a:rPr lang="en-US" dirty="0" smtClean="0"/>
-              <a:t>EF -</a:t>
-            </a:r>
-            <a:r>
-              <a:rPr lang="en-US" dirty="0" err="1" smtClean="0"/>
-              <a:t>Bastruktur</a:t>
+              <a:t>EF </a:t>
+            </a:r>
+            <a:r>
+              <a:rPr lang="en-US" smtClean="0"/>
+              <a:t>-Basstruktur</a:t>
             </a:r>
             <a:endParaRPr lang="sv-SE" dirty="0"/>
           </a:p>
@@ -13336,8 +13368,19 @@
           <a:p>
             <a:r>
               <a:rPr lang="en-US" dirty="0" smtClean="0"/>
-              <a:t>Enable-Migrations (DAL default project)</a:t>
-            </a:r>
+              <a:t>Enable-Migrations (DAL default </a:t>
+            </a:r>
+            <a:r>
+              <a:rPr lang="en-US" smtClean="0"/>
+              <a:t>project)</a:t>
+            </a:r>
+          </a:p>
+          <a:p>
+            <a:r>
+              <a:rPr lang="en-US" smtClean="0"/>
+              <a:t>Connection string och config</a:t>
+            </a:r>
+            <a:endParaRPr lang="en-US" dirty="0" smtClean="0"/>
           </a:p>
           <a:p>
             <a:r>
@@ -13350,13 +13393,27 @@
             </a:r>
             <a:r>
               <a:rPr lang="en-US" dirty="0" smtClean="0"/>
-              <a:t> (default)</a:t>
-            </a:r>
-          </a:p>
-          <a:p>
+              <a:t> (</a:t>
+            </a:r>
+            <a:r>
+              <a:rPr lang="en-US" smtClean="0"/>
+              <a:t>default)</a:t>
+            </a:r>
+          </a:p>
+          <a:p>
+            <a:r>
+              <a:rPr lang="en-US"/>
+              <a:t>Add-Migration "Initial“</a:t>
+            </a:r>
+          </a:p>
+          <a:p>
+            <a:r>
+              <a:rPr lang="en-US" smtClean="0"/>
+              <a:t>Visa hur </a:t>
+            </a:r>
             <a:r>
               <a:rPr lang="en-US" dirty="0" err="1" smtClean="0"/>
-              <a:t>Hur</a:t>
+              <a:t>ser</a:t>
             </a:r>
             <a:r>
               <a:rPr lang="en-US" dirty="0" smtClean="0"/>
@@ -13364,78 +13421,51 @@
             </a:r>
             <a:r>
               <a:rPr lang="en-US" dirty="0" err="1" smtClean="0"/>
-              <a:t>ser</a:t>
+              <a:t>en</a:t>
             </a:r>
             <a:r>
               <a:rPr lang="en-US" dirty="0" smtClean="0"/>
               <a:t> </a:t>
             </a:r>
             <a:r>
-              <a:rPr lang="en-US" dirty="0" err="1" smtClean="0"/>
-              <a:t>en</a:t>
-            </a:r>
-            <a:r>
-              <a:rPr lang="en-US" dirty="0" smtClean="0"/>
-              <a:t> </a:t>
-            </a:r>
-            <a:r>
-              <a:rPr lang="en-US" dirty="0" err="1" smtClean="0"/>
+              <a:rPr lang="en-US" err="1" smtClean="0"/>
               <a:t>migrering</a:t>
             </a:r>
             <a:r>
-              <a:rPr lang="en-US" dirty="0" smtClean="0"/>
-              <a:t> </a:t>
-            </a:r>
-            <a:r>
-              <a:rPr lang="en-US" dirty="0" err="1" smtClean="0"/>
-              <a:t>ut</a:t>
-            </a:r>
-            <a:r>
-              <a:rPr lang="en-US" dirty="0" smtClean="0"/>
-              <a:t>?</a:t>
-            </a:r>
-          </a:p>
-          <a:p>
-            <a:r>
-              <a:rPr lang="en-US" dirty="0" smtClean="0"/>
-              <a:t>Migrations </a:t>
-            </a:r>
-            <a:r>
-              <a:rPr lang="en-US" dirty="0" err="1" smtClean="0"/>
-              <a:t>i</a:t>
-            </a:r>
-            <a:r>
-              <a:rPr lang="en-US" dirty="0" smtClean="0"/>
-              <a:t> team??</a:t>
-            </a:r>
-          </a:p>
-          <a:p>
+              <a:rPr lang="en-US" smtClean="0"/>
+              <a:t> ut</a:t>
+            </a:r>
+            <a:endParaRPr lang="en-US" dirty="0" smtClean="0"/>
+          </a:p>
+          <a:p>
+            <a:r>
+              <a:rPr lang="en-US" smtClean="0"/>
+              <a:t>Update-Database </a:t>
+            </a:r>
             <a:r>
               <a:rPr lang="en-US" dirty="0"/>
-              <a:t>Add-Migration "</a:t>
-            </a:r>
-            <a:r>
-              <a:rPr lang="en-US" dirty="0" smtClean="0"/>
-              <a:t>Initial“</a:t>
-            </a:r>
-          </a:p>
-          <a:p>
-            <a:r>
-              <a:rPr lang="en-US" dirty="0"/>
-              <a:t>Update-Database (-</a:t>
+              <a:t>(-</a:t>
             </a:r>
             <a:r>
               <a:rPr lang="en-US" dirty="0" err="1"/>
               <a:t>TargetMigration</a:t>
             </a:r>
             <a:r>
-              <a:rPr lang="en-US" dirty="0"/>
+              <a:rPr lang="en-US"/>
               <a:t>)</a:t>
             </a:r>
             <a:r>
-              <a:rPr lang="en-GB" dirty="0" smtClean="0"/>
+              <a:rPr lang="en-GB" smtClean="0"/>
               <a:t> </a:t>
             </a:r>
+          </a:p>
+          <a:p>
+            <a:r>
+              <a:rPr lang="en-US"/>
+              <a:t>Migrations i team??</a:t>
+            </a:r>
+          </a:p>
+          <a:p>
             <a:endParaRPr lang="sv-SE" dirty="0"/>
           </a:p>
         </p:txBody>
@@ -13552,12 +13582,18 @@
               <a:t> </a:t>
             </a:r>
             <a:r>
-              <a:rPr lang="en-GB" dirty="0" err="1" smtClean="0"/>
+              <a:rPr lang="en-GB" err="1" smtClean="0"/>
               <a:t>vägen</a:t>
             </a:r>
             <a:r>
-              <a:rPr lang="en-GB" dirty="0" smtClean="0"/>
-              <a:t>. </a:t>
+              <a:rPr lang="en-GB" smtClean="0"/>
+              <a:t>.</a:t>
+            </a:r>
+          </a:p>
+          <a:p>
+            <a:r>
+              <a:rPr lang="en-GB" smtClean="0"/>
+              <a:t>Debug+Postman </a:t>
             </a:r>
             <a:endParaRPr lang="sv-SE" dirty="0"/>
           </a:p>
@@ -13638,7 +13674,9 @@
         </p:nvSpPr>
         <p:spPr/>
         <p:txBody>
-          <a:bodyPr/>
+          <a:bodyPr>
+            <a:normAutofit/>
+          </a:bodyPr>
           <a:lstStyle/>
           <a:p>
             <a:r>
@@ -13676,19 +13714,47 @@
           </a:p>
           <a:p>
             <a:r>
-              <a:rPr lang="en-GB" dirty="0" err="1" smtClean="0"/>
-              <a:t>UsingContextWithoutDetectChanges</a:t>
-            </a:r>
-            <a:endParaRPr lang="en-GB" dirty="0" smtClean="0"/>
-          </a:p>
-          <a:p>
-            <a:r>
-              <a:rPr lang="en-GB" dirty="0" err="1" smtClean="0"/>
-              <a:t>Små</a:t>
-            </a:r>
-            <a:r>
-              <a:rPr lang="en-GB" dirty="0" smtClean="0"/>
-              <a:t> </a:t>
+              <a:rPr lang="en-GB"/>
+              <a:t>Context.DetectChanges = false</a:t>
+            </a:r>
+            <a:r>
+              <a:rPr lang="en-GB"/>
+              <a:t>, </a:t>
+            </a:r>
+            <a:r>
+              <a:rPr lang="en-GB" smtClean="0"/>
+              <a:t>se </a:t>
+            </a:r>
+            <a:r>
+              <a:rPr lang="en-GB" smtClean="0">
+                <a:hlinkClick r:id="rId2"/>
+              </a:rPr>
+              <a:t>http</a:t>
+            </a:r>
+            <a:r>
+              <a:rPr lang="en-GB">
+                <a:hlinkClick r:id="rId2"/>
+              </a:rPr>
+              <a:t>://</a:t>
+            </a:r>
+            <a:r>
+              <a:rPr lang="en-GB">
+                <a:hlinkClick r:id="rId2"/>
+              </a:rPr>
+              <a:t>blog.oneunicorn.com/2012/03/12/secrets-of-detectchanges-part-3-switching-off-automatic-detectchanges</a:t>
+            </a:r>
+            <a:r>
+              <a:rPr lang="en-GB" smtClean="0">
+                <a:hlinkClick r:id="rId2"/>
+              </a:rPr>
+              <a:t>/</a:t>
+            </a:r>
+            <a:endParaRPr lang="en-GB"/>
+          </a:p>
+          <a:p>
+            <a:r>
+              <a:rPr lang="en-GB" smtClean="0"/>
+              <a:t>Små </a:t>
             </a:r>
             <a:r>
               <a:rPr lang="en-GB" dirty="0" err="1" smtClean="0"/>
@@ -13934,16 +14000,16 @@
               <a:t> </a:t>
             </a:r>
             <a:r>
+              <a:rPr lang="en-GB" err="1" smtClean="0"/>
+              <a:t>löser</a:t>
+            </a:r>
+            <a:r>
+              <a:rPr lang="en-GB" smtClean="0"/>
+              <a:t> versionshantering </a:t>
+            </a:r>
+            <a:r>
               <a:rPr lang="en-GB" dirty="0" err="1" smtClean="0"/>
-              <a:t>löser</a:t>
-            </a:r>
-            <a:r>
-              <a:rPr lang="en-GB" dirty="0" smtClean="0"/>
-              <a:t> version </a:t>
-            </a:r>
-            <a:r>
-              <a:rPr lang="en-GB" dirty="0" err="1" smtClean="0"/>
-              <a:t>hantering</a:t>
+              <a:t>av</a:t>
             </a:r>
             <a:r>
               <a:rPr lang="en-GB" dirty="0" smtClean="0"/>
@@ -13951,15 +14017,35 @@
             </a:r>
             <a:r>
               <a:rPr lang="en-GB" dirty="0" err="1" smtClean="0"/>
-              <a:t>av</a:t>
+              <a:t>db</a:t>
             </a:r>
             <a:r>
               <a:rPr lang="en-GB" dirty="0" smtClean="0"/>
               <a:t> </a:t>
             </a:r>
             <a:r>
+              <a:rPr lang="en-GB" err="1" smtClean="0"/>
+              <a:t>och</a:t>
+            </a:r>
+            <a:r>
+              <a:rPr lang="en-GB" smtClean="0"/>
+              <a:t> ger möjlighet till bra </a:t>
+            </a:r>
+            <a:r>
               <a:rPr lang="en-GB" dirty="0" err="1" smtClean="0"/>
-              <a:t>db</a:t>
+              <a:t>testbarhet</a:t>
+            </a:r>
+            <a:r>
+              <a:rPr lang="en-GB" dirty="0"/>
+              <a:t> </a:t>
+            </a:r>
+            <a:r>
+              <a:rPr lang="en-GB" dirty="0" smtClean="0"/>
+              <a:t>(</a:t>
+            </a:r>
+            <a:r>
+              <a:rPr lang="en-GB" dirty="0" err="1" smtClean="0"/>
+              <a:t>i</a:t>
             </a:r>
             <a:r>
               <a:rPr lang="en-GB" dirty="0" smtClean="0"/>
@@ -13967,27 +14053,17 @@
             </a:r>
             <a:r>
               <a:rPr lang="en-GB" dirty="0" err="1" smtClean="0"/>
-              <a:t>och</a:t>
+              <a:t>jämförelse</a:t>
             </a:r>
             <a:r>
               <a:rPr lang="en-GB" dirty="0" smtClean="0"/>
-              <a:t> bra </a:t>
-            </a:r>
+              <a:t> med SP:s) </a:t>
+            </a:r>
+          </a:p>
+          <a:p>
             <a:r>
               <a:rPr lang="en-GB" dirty="0" err="1" smtClean="0"/>
-              <a:t>testbarhet</a:t>
-            </a:r>
-            <a:r>
-              <a:rPr lang="en-GB" dirty="0"/>
-              <a:t> </a:t>
-            </a:r>
-            <a:r>
-              <a:rPr lang="en-GB" dirty="0" smtClean="0"/>
-              <a:t>(</a:t>
-            </a:r>
-            <a:r>
-              <a:rPr lang="en-GB" dirty="0" err="1" smtClean="0"/>
-              <a:t>i</a:t>
+              <a:t>Snabbt</a:t>
             </a:r>
             <a:r>
               <a:rPr lang="en-GB" dirty="0" smtClean="0"/>
@@ -13995,60 +14071,34 @@
             </a:r>
             <a:r>
               <a:rPr lang="en-GB" dirty="0" err="1" smtClean="0"/>
-              <a:t>jämförelse</a:t>
-            </a:r>
-            <a:r>
-              <a:rPr lang="en-GB" smtClean="0"/>
-              <a:t> med SP:s) </a:t>
-            </a:r>
-            <a:endParaRPr lang="en-GB" dirty="0" smtClean="0"/>
-          </a:p>
-          <a:p>
-            <a:r>
-              <a:rPr lang="en-GB" dirty="0" err="1" smtClean="0"/>
-              <a:t>Snabbt</a:t>
+              <a:t>att</a:t>
             </a:r>
             <a:r>
               <a:rPr lang="en-GB" dirty="0" smtClean="0"/>
               <a:t> </a:t>
             </a:r>
             <a:r>
-              <a:rPr lang="en-GB" dirty="0" err="1" smtClean="0"/>
-              <a:t>att</a:t>
+              <a:rPr lang="en-GB" err="1" smtClean="0"/>
+              <a:t>bygga</a:t>
+            </a:r>
+            <a:r>
+              <a:rPr lang="en-GB" smtClean="0"/>
+              <a:t> CRUD-datalager</a:t>
             </a:r>
             <a:r>
               <a:rPr lang="en-GB" dirty="0" smtClean="0"/>
-              <a:t> </a:t>
-            </a:r>
-            <a:r>
-              <a:rPr lang="en-GB" dirty="0" err="1" smtClean="0"/>
-              <a:t>bygga</a:t>
-            </a:r>
-            <a:r>
-              <a:rPr lang="en-GB" dirty="0" smtClean="0"/>
-              <a:t> </a:t>
-            </a:r>
-            <a:r>
-              <a:rPr lang="en-GB" dirty="0" err="1" smtClean="0"/>
-              <a:t>datalager</a:t>
-            </a:r>
-            <a:r>
-              <a:rPr lang="en-GB" dirty="0" smtClean="0"/>
-              <a:t>, men </a:t>
-            </a:r>
-            <a:r>
-              <a:rPr lang="en-GB" dirty="0" err="1" smtClean="0"/>
-              <a:t>ooptimerat</a:t>
-            </a:r>
-            <a:r>
-              <a:rPr lang="en-GB" dirty="0" smtClean="0"/>
-              <a:t>.</a:t>
-            </a:r>
-          </a:p>
-          <a:p>
-            <a:r>
-              <a:rPr lang="en-GB" dirty="0" smtClean="0"/>
-              <a:t>Optimera </a:t>
+              <a:t>, </a:t>
+            </a:r>
+            <a:r>
+              <a:rPr lang="en-GB" smtClean="0"/>
+              <a:t>men ooptimerat.</a:t>
+            </a:r>
+            <a:endParaRPr lang="en-GB" dirty="0" smtClean="0"/>
+          </a:p>
+          <a:p>
+            <a:r>
+              <a:rPr lang="en-GB" smtClean="0"/>
+              <a:t>Optimera (till param. SQL) </a:t>
             </a:r>
             <a:r>
               <a:rPr lang="en-GB" dirty="0" err="1" smtClean="0"/>

</xml_diff>